<commit_message>
Adding updated Cast table and new Crew table
</commit_message>
<xml_diff>
--- a/CHED_FinalProject_Presentation_draft.pptx
+++ b/CHED_FinalProject_Presentation_draft.pptx
@@ -1028,7 +1028,7 @@
           <a:p>
             <a:fld id="{38269416-F07D-4B93-8964-5E1BE7CBD720}" type="datetimeFigureOut">
               <a:rPr lang="id-ID" smtClean="0"/>
-              <a:t>08/03/2019</a:t>
+              <a:t>09/03/2019</a:t>
             </a:fld>
             <a:endParaRPr lang="id-ID"/>
           </a:p>
@@ -2643,7 +2643,7 @@
                 <a:ea typeface="Lato" panose="020F0502020204030203" pitchFamily="34" charset="0"/>
                 <a:cs typeface="Lato" panose="020F0502020204030203" pitchFamily="34" charset="0"/>
               </a:rPr>
-              <a:t>Power Points:	Python &amp; Pandas	Apply a weight to the individual variable (var = Actor, Production Company, Key Word) based on number of times each appeared in a record from the dataset; then calculating the Power Points of each movie by summing the weighted numbers of each, respective variable per record (movie)</a:t>
+              <a:t>Star Power:	Python &amp; Pandas	Apply a weight to the individual variable (var = Actor, Production Company, Key Word) based on number of times each appeared in a record from the dataset; then calculating the Star Power of each movie by summing the weighted numbers of each, respective variable per record (movie)</a:t>
             </a:r>
             <a:endParaRPr lang="id-ID" sz="1400" dirty="0">
               <a:latin typeface="Lato" panose="020F0502020204030203" pitchFamily="34" charset="0"/>
@@ -3813,7 +3813,7 @@
                 <a:ea typeface="Lato Black" panose="020F0502020204030203" pitchFamily="34" charset="0"/>
                 <a:cs typeface="Lato Black" panose="020F0502020204030203" pitchFamily="34" charset="0"/>
               </a:rPr>
-              <a:t>Power</a:t>
+              <a:t>Star</a:t>
             </a:r>
           </a:p>
           <a:p>
@@ -3835,7 +3835,7 @@
                 <a:ea typeface="Lato Black" panose="020F0502020204030203" pitchFamily="34" charset="0"/>
                 <a:cs typeface="Lato Black" panose="020F0502020204030203" pitchFamily="34" charset="0"/>
               </a:rPr>
-              <a:t>Points</a:t>
+              <a:t>Power</a:t>
             </a:r>
             <a:endParaRPr lang="id-ID" sz="6000" b="1" dirty="0">
               <a:solidFill>

</xml_diff>